<commit_message>
Lessons for arrays, form lessons notes, anonymous functions code
</commit_message>
<xml_diff>
--- a/Week_06_Multiple_Screens/11_/Intro to Responsive.pptx
+++ b/Week_06_Multiple_Screens/11_/Intro to Responsive.pptx
@@ -298,7 +298,7 @@
           <a:p>
             <a:fld id="{AFF74711-DE64-47F8-904F-BBB1A62568FC}" type="datetimeFigureOut">
               <a:rPr lang="en-US" smtClean="0"/>
-              <a:t>9/4/2013</a:t>
+              <a:t>9/12/2013</a:t>
             </a:fld>
             <a:endParaRPr lang="en-US"/>
           </a:p>
@@ -468,7 +468,7 @@
           <a:p>
             <a:fld id="{AFF74711-DE64-47F8-904F-BBB1A62568FC}" type="datetimeFigureOut">
               <a:rPr lang="en-US" smtClean="0"/>
-              <a:t>9/4/2013</a:t>
+              <a:t>9/12/2013</a:t>
             </a:fld>
             <a:endParaRPr lang="en-US"/>
           </a:p>
@@ -648,7 +648,7 @@
           <a:p>
             <a:fld id="{AFF74711-DE64-47F8-904F-BBB1A62568FC}" type="datetimeFigureOut">
               <a:rPr lang="en-US" smtClean="0"/>
-              <a:t>9/4/2013</a:t>
+              <a:t>9/12/2013</a:t>
             </a:fld>
             <a:endParaRPr lang="en-US"/>
           </a:p>
@@ -818,7 +818,7 @@
           <a:p>
             <a:fld id="{AFF74711-DE64-47F8-904F-BBB1A62568FC}" type="datetimeFigureOut">
               <a:rPr lang="en-US" smtClean="0"/>
-              <a:t>9/4/2013</a:t>
+              <a:t>9/12/2013</a:t>
             </a:fld>
             <a:endParaRPr lang="en-US"/>
           </a:p>
@@ -1064,7 +1064,7 @@
           <a:p>
             <a:fld id="{AFF74711-DE64-47F8-904F-BBB1A62568FC}" type="datetimeFigureOut">
               <a:rPr lang="en-US" smtClean="0"/>
-              <a:t>9/4/2013</a:t>
+              <a:t>9/12/2013</a:t>
             </a:fld>
             <a:endParaRPr lang="en-US"/>
           </a:p>
@@ -1352,7 +1352,7 @@
           <a:p>
             <a:fld id="{AFF74711-DE64-47F8-904F-BBB1A62568FC}" type="datetimeFigureOut">
               <a:rPr lang="en-US" smtClean="0"/>
-              <a:t>9/4/2013</a:t>
+              <a:t>9/12/2013</a:t>
             </a:fld>
             <a:endParaRPr lang="en-US"/>
           </a:p>
@@ -1774,7 +1774,7 @@
           <a:p>
             <a:fld id="{AFF74711-DE64-47F8-904F-BBB1A62568FC}" type="datetimeFigureOut">
               <a:rPr lang="en-US" smtClean="0"/>
-              <a:t>9/4/2013</a:t>
+              <a:t>9/12/2013</a:t>
             </a:fld>
             <a:endParaRPr lang="en-US"/>
           </a:p>
@@ -1892,7 +1892,7 @@
           <a:p>
             <a:fld id="{AFF74711-DE64-47F8-904F-BBB1A62568FC}" type="datetimeFigureOut">
               <a:rPr lang="en-US" smtClean="0"/>
-              <a:t>9/4/2013</a:t>
+              <a:t>9/12/2013</a:t>
             </a:fld>
             <a:endParaRPr lang="en-US"/>
           </a:p>
@@ -1987,7 +1987,7 @@
           <a:p>
             <a:fld id="{AFF74711-DE64-47F8-904F-BBB1A62568FC}" type="datetimeFigureOut">
               <a:rPr lang="en-US" smtClean="0"/>
-              <a:t>9/4/2013</a:t>
+              <a:t>9/12/2013</a:t>
             </a:fld>
             <a:endParaRPr lang="en-US"/>
           </a:p>
@@ -2264,7 +2264,7 @@
           <a:p>
             <a:fld id="{AFF74711-DE64-47F8-904F-BBB1A62568FC}" type="datetimeFigureOut">
               <a:rPr lang="en-US" smtClean="0"/>
-              <a:t>9/4/2013</a:t>
+              <a:t>9/12/2013</a:t>
             </a:fld>
             <a:endParaRPr lang="en-US"/>
           </a:p>
@@ -2517,7 +2517,7 @@
           <a:p>
             <a:fld id="{AFF74711-DE64-47F8-904F-BBB1A62568FC}" type="datetimeFigureOut">
               <a:rPr lang="en-US" smtClean="0"/>
-              <a:t>9/4/2013</a:t>
+              <a:t>9/12/2013</a:t>
             </a:fld>
             <a:endParaRPr lang="en-US"/>
           </a:p>
@@ -2730,7 +2730,7 @@
           <a:p>
             <a:fld id="{AFF74711-DE64-47F8-904F-BBB1A62568FC}" type="datetimeFigureOut">
               <a:rPr lang="en-US" smtClean="0"/>
-              <a:t>9/4/2013</a:t>
+              <a:t>9/12/2013</a:t>
             </a:fld>
             <a:endParaRPr lang="en-US"/>
           </a:p>
@@ -3307,17 +3307,12 @@
           <a:p>
             <a:r>
               <a:rPr lang="en-US" smtClean="0"/>
-              <a:t>Transition</a:t>
-            </a:r>
-            <a:r>
-              <a:rPr lang="en-US" smtClean="0"/>
-              <a:t> </a:t>
+              <a:t>Transition </a:t>
             </a:r>
             <a:r>
               <a:rPr lang="en-US" dirty="0" smtClean="0"/>
               <a:t>(make media query changes smoother)</a:t>
             </a:r>
-            <a:endParaRPr lang="en-US" dirty="0" smtClean="0"/>
           </a:p>
         </p:txBody>
       </p:sp>
@@ -3648,7 +3643,6 @@
               <a:rPr lang="en-US" dirty="0" smtClean="0"/>
               <a:t>Ups.com</a:t>
             </a:r>
-            <a:endParaRPr lang="en-US" dirty="0" smtClean="0"/>
           </a:p>
           <a:p>
             <a:r>

</xml_diff>